<commit_message>
I am approaching the end of this data cleaning. I want to make an update on all the files that I have edited. For the rest of the time, I will keep editing the README to give other people a chance to see what I have done, and also make sure all the data are carefully dealt with
</commit_message>
<xml_diff>
--- a/UKCodeBook Comparison.pptx
+++ b/UKCodeBook Comparison.pptx
@@ -215,7 +215,7 @@
           <a:p>
             <a:fld id="{4E6FE82D-8F56-A248-90E3-829C9C6251C4}" type="datetimeFigureOut">
               <a:rPr lang="en-US" smtClean="0"/>
-              <a:t>2/20/24</a:t>
+              <a:t>2/28/24</a:t>
             </a:fld>
             <a:endParaRPr lang="en-US"/>
           </a:p>
@@ -713,7 +713,7 @@
           <a:p>
             <a:fld id="{B5CC1712-1B78-C54C-8C0C-8653B5ECEDE2}" type="datetimeFigureOut">
               <a:rPr lang="en-US" smtClean="0"/>
-              <a:t>2/20/24</a:t>
+              <a:t>2/28/24</a:t>
             </a:fld>
             <a:endParaRPr lang="en-US"/>
           </a:p>
@@ -911,7 +911,7 @@
           <a:p>
             <a:fld id="{B5CC1712-1B78-C54C-8C0C-8653B5ECEDE2}" type="datetimeFigureOut">
               <a:rPr lang="en-US" smtClean="0"/>
-              <a:t>2/20/24</a:t>
+              <a:t>2/28/24</a:t>
             </a:fld>
             <a:endParaRPr lang="en-US"/>
           </a:p>
@@ -1119,7 +1119,7 @@
           <a:p>
             <a:fld id="{B5CC1712-1B78-C54C-8C0C-8653B5ECEDE2}" type="datetimeFigureOut">
               <a:rPr lang="en-US" smtClean="0"/>
-              <a:t>2/20/24</a:t>
+              <a:t>2/28/24</a:t>
             </a:fld>
             <a:endParaRPr lang="en-US"/>
           </a:p>
@@ -1317,7 +1317,7 @@
           <a:p>
             <a:fld id="{B5CC1712-1B78-C54C-8C0C-8653B5ECEDE2}" type="datetimeFigureOut">
               <a:rPr lang="en-US" smtClean="0"/>
-              <a:t>2/20/24</a:t>
+              <a:t>2/28/24</a:t>
             </a:fld>
             <a:endParaRPr lang="en-US"/>
           </a:p>
@@ -1592,7 +1592,7 @@
           <a:p>
             <a:fld id="{B5CC1712-1B78-C54C-8C0C-8653B5ECEDE2}" type="datetimeFigureOut">
               <a:rPr lang="en-US" smtClean="0"/>
-              <a:t>2/20/24</a:t>
+              <a:t>2/28/24</a:t>
             </a:fld>
             <a:endParaRPr lang="en-US"/>
           </a:p>
@@ -1857,7 +1857,7 @@
           <a:p>
             <a:fld id="{B5CC1712-1B78-C54C-8C0C-8653B5ECEDE2}" type="datetimeFigureOut">
               <a:rPr lang="en-US" smtClean="0"/>
-              <a:t>2/20/24</a:t>
+              <a:t>2/28/24</a:t>
             </a:fld>
             <a:endParaRPr lang="en-US"/>
           </a:p>
@@ -2269,7 +2269,7 @@
           <a:p>
             <a:fld id="{B5CC1712-1B78-C54C-8C0C-8653B5ECEDE2}" type="datetimeFigureOut">
               <a:rPr lang="en-US" smtClean="0"/>
-              <a:t>2/20/24</a:t>
+              <a:t>2/28/24</a:t>
             </a:fld>
             <a:endParaRPr lang="en-US"/>
           </a:p>
@@ -2410,7 +2410,7 @@
           <a:p>
             <a:fld id="{B5CC1712-1B78-C54C-8C0C-8653B5ECEDE2}" type="datetimeFigureOut">
               <a:rPr lang="en-US" smtClean="0"/>
-              <a:t>2/20/24</a:t>
+              <a:t>2/28/24</a:t>
             </a:fld>
             <a:endParaRPr lang="en-US"/>
           </a:p>
@@ -2523,7 +2523,7 @@
           <a:p>
             <a:fld id="{B5CC1712-1B78-C54C-8C0C-8653B5ECEDE2}" type="datetimeFigureOut">
               <a:rPr lang="en-US" smtClean="0"/>
-              <a:t>2/20/24</a:t>
+              <a:t>2/28/24</a:t>
             </a:fld>
             <a:endParaRPr lang="en-US"/>
           </a:p>
@@ -2834,7 +2834,7 @@
           <a:p>
             <a:fld id="{B5CC1712-1B78-C54C-8C0C-8653B5ECEDE2}" type="datetimeFigureOut">
               <a:rPr lang="en-US" smtClean="0"/>
-              <a:t>2/20/24</a:t>
+              <a:t>2/28/24</a:t>
             </a:fld>
             <a:endParaRPr lang="en-US"/>
           </a:p>
@@ -3122,7 +3122,7 @@
           <a:p>
             <a:fld id="{B5CC1712-1B78-C54C-8C0C-8653B5ECEDE2}" type="datetimeFigureOut">
               <a:rPr lang="en-US" smtClean="0"/>
-              <a:t>2/20/24</a:t>
+              <a:t>2/28/24</a:t>
             </a:fld>
             <a:endParaRPr lang="en-US"/>
           </a:p>
@@ -3363,7 +3363,7 @@
           <a:p>
             <a:fld id="{B5CC1712-1B78-C54C-8C0C-8653B5ECEDE2}" type="datetimeFigureOut">
               <a:rPr lang="en-US" smtClean="0"/>
-              <a:t>2/20/24</a:t>
+              <a:t>2/28/24</a:t>
             </a:fld>
             <a:endParaRPr lang="en-US"/>
           </a:p>
@@ -6073,7 +6073,7 @@
         </p:blipFill>
         <p:spPr bwMode="auto">
           <a:xfrm>
-            <a:off x="8273493" y="1968500"/>
+            <a:off x="8218408" y="230188"/>
             <a:ext cx="3276600" cy="2921000"/>
           </a:xfrm>
           <a:prstGeom prst="rect">
@@ -6143,7 +6143,7 @@
         </p:blipFill>
         <p:spPr>
           <a:xfrm>
-            <a:off x="357963" y="4055556"/>
+            <a:off x="454924" y="3514936"/>
             <a:ext cx="4572000" cy="482600"/>
           </a:xfrm>
           <a:prstGeom prst="rect">
@@ -6151,6 +6151,113 @@
           </a:prstGeom>
         </p:spPr>
       </p:pic>
+      <p:pic>
+        <p:nvPicPr>
+          <p:cNvPr id="5" name="Picture 4" descr="A screenshot of a document&#10;&#10;Description automatically generated">
+            <a:extLst>
+              <a:ext uri="{FF2B5EF4-FFF2-40B4-BE49-F238E27FC236}">
+                <a16:creationId xmlns:a16="http://schemas.microsoft.com/office/drawing/2014/main" id="{469691B7-EB47-BAE6-16BB-981921045FEB}"/>
+              </a:ext>
+            </a:extLst>
+          </p:cNvPr>
+          <p:cNvPicPr>
+            <a:picLocks noChangeAspect="1"/>
+          </p:cNvPicPr>
+          <p:nvPr/>
+        </p:nvPicPr>
+        <p:blipFill>
+          <a:blip r:embed="rId6"/>
+          <a:stretch>
+            <a:fillRect/>
+          </a:stretch>
+        </p:blipFill>
+        <p:spPr>
+          <a:xfrm>
+            <a:off x="8218408" y="3151188"/>
+            <a:ext cx="1578417" cy="3571875"/>
+          </a:xfrm>
+          <a:prstGeom prst="rect">
+            <a:avLst/>
+          </a:prstGeom>
+        </p:spPr>
+      </p:pic>
+      <p:pic>
+        <p:nvPicPr>
+          <p:cNvPr id="8" name="Picture 7" descr="A screenshot of a phone&#10;&#10;Description automatically generated">
+            <a:extLst>
+              <a:ext uri="{FF2B5EF4-FFF2-40B4-BE49-F238E27FC236}">
+                <a16:creationId xmlns:a16="http://schemas.microsoft.com/office/drawing/2014/main" id="{3442006C-01C1-C6CC-A1A5-D934A5748DFD}"/>
+              </a:ext>
+            </a:extLst>
+          </p:cNvPr>
+          <p:cNvPicPr>
+            <a:picLocks noChangeAspect="1"/>
+          </p:cNvPicPr>
+          <p:nvPr/>
+        </p:nvPicPr>
+        <p:blipFill>
+          <a:blip r:embed="rId7"/>
+          <a:stretch>
+            <a:fillRect/>
+          </a:stretch>
+        </p:blipFill>
+        <p:spPr>
+          <a:xfrm>
+            <a:off x="10405075" y="3286125"/>
+            <a:ext cx="1332001" cy="3136305"/>
+          </a:xfrm>
+          <a:prstGeom prst="rect">
+            <a:avLst/>
+          </a:prstGeom>
+        </p:spPr>
+      </p:pic>
+      <p:sp>
+        <p:nvSpPr>
+          <p:cNvPr id="9" name="TextBox 8">
+            <a:extLst>
+              <a:ext uri="{FF2B5EF4-FFF2-40B4-BE49-F238E27FC236}">
+                <a16:creationId xmlns:a16="http://schemas.microsoft.com/office/drawing/2014/main" id="{303BB28E-8CCD-708D-887E-4E9B456D948E}"/>
+              </a:ext>
+            </a:extLst>
+          </p:cNvPr>
+          <p:cNvSpPr txBox="1"/>
+          <p:nvPr/>
+        </p:nvSpPr>
+        <p:spPr>
+          <a:xfrm>
+            <a:off x="530710" y="4475460"/>
+            <a:ext cx="7426905" cy="923330"/>
+          </a:xfrm>
+          <a:prstGeom prst="rect">
+            <a:avLst/>
+          </a:prstGeom>
+          <a:noFill/>
+        </p:spPr>
+        <p:txBody>
+          <a:bodyPr wrap="none" rtlCol="0">
+            <a:spAutoFit/>
+          </a:bodyPr>
+          <a:lstStyle/>
+          <a:p>
+            <a:r>
+              <a:rPr lang="en-US" dirty="0"/>
+              <a:t>The event I could think of is the stages that a bill has gone through.</a:t>
+            </a:r>
+          </a:p>
+          <a:p>
+            <a:r>
+              <a:rPr lang="en-US" dirty="0"/>
+              <a:t>Unlike US Measure Action, the UK parliament website does not keep a record</a:t>
+            </a:r>
+          </a:p>
+          <a:p>
+            <a:r>
+              <a:rPr lang="en-US" dirty="0"/>
+              <a:t>As detailed as US Congress</a:t>
+            </a:r>
+          </a:p>
+        </p:txBody>
+      </p:sp>
     </p:spTree>
     <p:extLst>
       <p:ext uri="{BB962C8B-B14F-4D97-AF65-F5344CB8AC3E}">

</xml_diff>